<commit_message>
added power point changes
</commit_message>
<xml_diff>
--- a/rbtree_poster.pptx
+++ b/rbtree_poster.pptx
@@ -3707,7 +3707,7 @@
         <p:spPr bwMode="auto">
           <a:xfrm>
             <a:off x="29260800" y="17801673"/>
-            <a:ext cx="13167360" cy="3724050"/>
+            <a:ext cx="13167360" cy="5693820"/>
           </a:xfrm>
           <a:prstGeom prst="rect">
             <a:avLst/>
@@ -3832,14 +3832,29 @@
               <a:rPr lang="en-US" sz="3200" dirty="0" smtClean="0">
                 <a:latin typeface="Calibri" pitchFamily="34" charset="0"/>
               </a:rPr>
-              <a:t>RB Trees ar</a:t>
+              <a:t>RB Trees are used in real world systems to make searching and sorting easier, faster, and more efficient. Red Black trees are often times the most efficient tree-like data structure to use in the appropriate context. The Red Black Tree can also be used to implement other data structures in the most efficient way possible. Although RB Trees are generally very efficient in terms of time complexity, they are sometimes less efficient than other data structures because of memory over head</a:t>
             </a:r>
             <a:r>
               <a:rPr lang="en-US" sz="3200" dirty="0" smtClean="0">
                 <a:latin typeface="Calibri" pitchFamily="34" charset="0"/>
               </a:rPr>
-              <a:t>e used in real world systems to make searching and sorting easier, faster, and more efficient. Red Black trees are often times the most efficient tree-like data structure to use in the appropriate context. The Red Black Tree can also be used to implement other data structures in the most efficient way possible. Although RB Trees are generally very efficient in terms of time complexity, they are sometimes less efficient than other data structures because of memory over head. </a:t>
-            </a:r>
+              <a:t>. </a:t>
+            </a:r>
+            <a:r>
+              <a:rPr lang="en-US" sz="3200" dirty="0" smtClean="0">
+                <a:latin typeface="Calibri" pitchFamily="34" charset="0"/>
+              </a:rPr>
+              <a:t>We’ve found that Red Black Trees work well along side Hash-like and Map data structures. We hope to see more Red Black Tree projects in the future. We hope to design and study more RB Tree systems and share </a:t>
+            </a:r>
+            <a:r>
+              <a:rPr lang="en-US" sz="3200" smtClean="0">
+                <a:latin typeface="Calibri" pitchFamily="34" charset="0"/>
+              </a:rPr>
+              <a:t>our results. </a:t>
+            </a:r>
+          </a:p>
+          <a:p>
+            <a:pPr eaLnBrk="1" hangingPunct="1"/>
             <a:endParaRPr lang="en-US" sz="3200" dirty="0">
               <a:latin typeface="Calibri" pitchFamily="34" charset="0"/>
             </a:endParaRPr>
@@ -4053,13 +4068,7 @@
               <a:rPr lang="en-US" sz="3200" dirty="0" smtClean="0">
                 <a:latin typeface="Calibri" pitchFamily="34" charset="0"/>
               </a:rPr>
-              <a:t>RB Tree Indirect Use: </a:t>
-            </a:r>
-            <a:r>
-              <a:rPr lang="en-US" sz="3200" dirty="0" smtClean="0">
-                <a:latin typeface="Calibri" pitchFamily="34" charset="0"/>
-              </a:rPr>
-              <a:t>We placed students into a Java Tree Map</a:t>
+              <a:t>RB Tree Indirect Use: We placed students into a Java Tree Map</a:t>
             </a:r>
           </a:p>
           <a:p>

</xml_diff>

<commit_message>
added changes to power point
</commit_message>
<xml_diff>
--- a/rbtree_poster.pptx
+++ b/rbtree_poster.pptx
@@ -321,7 +321,7 @@
           <a:p>
             <a:fld id="{985D6BDF-9D0E-4E2B-85B8-D8F4790360C9}" type="datetimeFigureOut">
               <a:rPr lang="en-US" smtClean="0"/>
-              <a:t>3/26/2018</a:t>
+              <a:t>3/28/2018</a:t>
             </a:fld>
             <a:endParaRPr lang="en-US" dirty="0"/>
           </a:p>
@@ -2622,33 +2622,77 @@
           <a:lstStyle/>
           <a:p>
             <a:r>
-              <a:rPr lang="en-US" sz="2800" dirty="0"/>
-              <a:t>[name]</a:t>
-            </a:r>
-          </a:p>
-          <a:p>
-            <a:r>
-              <a:rPr lang="en-US" sz="2800" dirty="0"/>
-              <a:t>[organization]</a:t>
-            </a:r>
-          </a:p>
-          <a:p>
-            <a:r>
-              <a:rPr lang="en-US" sz="2800" dirty="0"/>
-              <a:t>[address]</a:t>
-            </a:r>
-          </a:p>
-          <a:p>
-            <a:r>
-              <a:rPr lang="en-US" sz="2800" dirty="0"/>
-              <a:t>[email]</a:t>
-            </a:r>
-          </a:p>
-          <a:p>
-            <a:r>
-              <a:rPr lang="en-US" sz="2800" dirty="0"/>
-              <a:t>[phone]</a:t>
-            </a:r>
+              <a:rPr lang="en-US" sz="2800" dirty="0" smtClean="0"/>
+              <a:t>Joanne Wardell, KD Adkins, Austin Hufstetler, Omar Batyah, Beth Norton</a:t>
+            </a:r>
+            <a:endParaRPr lang="en-US" sz="2800" dirty="0"/>
+          </a:p>
+          <a:p>
+            <a:r>
+              <a:rPr lang="en-US" sz="2800" dirty="0" smtClean="0"/>
+              <a:t>Valdosta State University, Computer Science Department</a:t>
+            </a:r>
+            <a:endParaRPr lang="en-US" sz="2800" dirty="0"/>
+          </a:p>
+          <a:p>
+            <a:r>
+              <a:rPr lang="en-US" sz="2800" dirty="0" smtClean="0"/>
+              <a:t>1500 North Patterson Street</a:t>
+            </a:r>
+            <a:endParaRPr lang="en-US" sz="2800" dirty="0"/>
+          </a:p>
+          <a:p>
+            <a:r>
+              <a:rPr lang="en-US" sz="2800" dirty="0" smtClean="0"/>
+              <a:t>{</a:t>
+            </a:r>
+            <a:r>
+              <a:rPr lang="en-US" sz="2800" dirty="0" err="1" smtClean="0"/>
+              <a:t>jawardell</a:t>
+            </a:r>
+            <a:r>
+              <a:rPr lang="en-US" sz="2800" dirty="0" smtClean="0"/>
+              <a:t>, </a:t>
+            </a:r>
+            <a:r>
+              <a:rPr lang="en-US" sz="2800" dirty="0" err="1" smtClean="0"/>
+              <a:t>dsadkins</a:t>
+            </a:r>
+            <a:r>
+              <a:rPr lang="en-US" sz="2800" dirty="0" smtClean="0"/>
+              <a:t>, </a:t>
+            </a:r>
+            <a:r>
+              <a:rPr lang="en-US" sz="2800" dirty="0" err="1" smtClean="0"/>
+              <a:t>wahufstetler</a:t>
+            </a:r>
+            <a:r>
+              <a:rPr lang="en-US" sz="2800" dirty="0" smtClean="0"/>
+              <a:t>, </a:t>
+            </a:r>
+            <a:r>
+              <a:rPr lang="en-US" sz="2800" dirty="0" err="1" smtClean="0"/>
+              <a:t>obatyah</a:t>
+            </a:r>
+            <a:r>
+              <a:rPr lang="en-US" sz="2800" dirty="0" smtClean="0"/>
+              <a:t>, </a:t>
+            </a:r>
+            <a:r>
+              <a:rPr lang="en-US" sz="2800" dirty="0" err="1" smtClean="0"/>
+              <a:t>banorton</a:t>
+            </a:r>
+            <a:r>
+              <a:rPr lang="en-US" sz="2800" dirty="0" smtClean="0"/>
+              <a:t>} @valdosta.edu</a:t>
+            </a:r>
+          </a:p>
+          <a:p>
+            <a:r>
+              <a:rPr lang="en-US" sz="2800" dirty="0" smtClean="0"/>
+              <a:t>229-245-2496</a:t>
+            </a:r>
+            <a:endParaRPr lang="en-US" sz="2800" dirty="0"/>
           </a:p>
         </p:txBody>
       </p:sp>
@@ -3043,8 +3087,8 @@
         </p:nvSpPr>
         <p:spPr bwMode="auto">
           <a:xfrm>
-            <a:off x="15361920" y="5461698"/>
-            <a:ext cx="13197177" cy="7171147"/>
+            <a:off x="15361921" y="5461698"/>
+            <a:ext cx="13167360" cy="7171147"/>
           </a:xfrm>
           <a:prstGeom prst="rect">
             <a:avLst/>
@@ -3333,8 +3377,8 @@
         </p:nvSpPr>
         <p:spPr bwMode="auto">
           <a:xfrm>
-            <a:off x="29058042" y="5486400"/>
-            <a:ext cx="13167360" cy="9140917"/>
+            <a:off x="29077920" y="5461698"/>
+            <a:ext cx="13167360" cy="8032922"/>
           </a:xfrm>
           <a:prstGeom prst="rect">
             <a:avLst/>
@@ -3456,7 +3500,7 @@
           <a:p>
             <a:pPr eaLnBrk="1" hangingPunct="1"/>
             <a:r>
-              <a:rPr lang="en-US" sz="3200" dirty="0" smtClean="0">
+              <a:rPr lang="en-US" sz="2800" dirty="0" smtClean="0">
                 <a:latin typeface="Calibri" pitchFamily="34" charset="0"/>
               </a:rPr>
               <a:t>Places RB Trees could be used: </a:t>
@@ -3464,7 +3508,7 @@
           </a:p>
           <a:p>
             <a:pPr eaLnBrk="1" hangingPunct="1"/>
-            <a:endParaRPr lang="en-US" sz="3200" dirty="0">
+            <a:endParaRPr lang="en-US" sz="2800" dirty="0">
               <a:latin typeface="Calibri" pitchFamily="34" charset="0"/>
             </a:endParaRPr>
           </a:p>
@@ -3473,7 +3517,7 @@
               <a:buAutoNum type="romanUcPeriod"/>
             </a:pPr>
             <a:r>
-              <a:rPr lang="en-US" sz="3200" dirty="0" smtClean="0">
+              <a:rPr lang="en-US" sz="2800" dirty="0" smtClean="0">
                 <a:latin typeface="Calibri" pitchFamily="34" charset="0"/>
               </a:rPr>
               <a:t>Projects</a:t>
@@ -3482,156 +3526,216 @@
           <a:p>
             <a:pPr lvl="1" indent="0" eaLnBrk="1" hangingPunct="1"/>
             <a:r>
-              <a:rPr lang="en-US" sz="3200" dirty="0" smtClean="0">
-                <a:latin typeface="Calibri" pitchFamily="34" charset="0"/>
-              </a:rPr>
-              <a:t>a.</a:t>
-            </a:r>
-          </a:p>
-          <a:p>
-            <a:pPr lvl="1" indent="0" eaLnBrk="1" hangingPunct="1"/>
-            <a:r>
-              <a:rPr lang="en-US" sz="3200" dirty="0" smtClean="0">
-                <a:latin typeface="Calibri" pitchFamily="34" charset="0"/>
-              </a:rPr>
-              <a:t>b.</a:t>
-            </a:r>
-          </a:p>
-          <a:p>
-            <a:pPr eaLnBrk="1" hangingPunct="1"/>
-            <a:r>
-              <a:rPr lang="en-US" sz="3200" dirty="0" smtClean="0">
-                <a:latin typeface="Calibri" pitchFamily="34" charset="0"/>
-              </a:rPr>
-              <a:t>II. Data Structures</a:t>
-            </a:r>
-          </a:p>
-          <a:p>
-            <a:pPr lvl="1" indent="0" eaLnBrk="1" hangingPunct="1"/>
-            <a:r>
-              <a:rPr lang="en-US" sz="3200" dirty="0">
-                <a:latin typeface="Calibri" pitchFamily="34" charset="0"/>
-              </a:rPr>
-              <a:t>	 a.</a:t>
-            </a:r>
-          </a:p>
-          <a:p>
-            <a:pPr lvl="1" indent="0" eaLnBrk="1" hangingPunct="1"/>
-            <a:r>
-              <a:rPr lang="en-US" sz="3200" dirty="0" smtClean="0">
-                <a:latin typeface="Calibri" pitchFamily="34" charset="0"/>
-              </a:rPr>
-              <a:t>   b</a:t>
-            </a:r>
-            <a:r>
-              <a:rPr lang="en-US" sz="3200" dirty="0">
-                <a:latin typeface="Calibri" pitchFamily="34" charset="0"/>
-              </a:rPr>
-              <a:t>.</a:t>
-            </a:r>
-            <a:endParaRPr lang="en-US" sz="3200" dirty="0" smtClean="0">
+              <a:rPr lang="en-US" sz="2800" dirty="0" smtClean="0">
+                <a:latin typeface="Calibri" pitchFamily="34" charset="0"/>
+              </a:rPr>
+              <a:t>a</a:t>
+            </a:r>
+            <a:r>
+              <a:rPr lang="en-US" sz="2800" dirty="0" smtClean="0">
+                <a:latin typeface="Calibri" pitchFamily="34" charset="0"/>
+              </a:rPr>
+              <a:t>. Graphics </a:t>
+            </a:r>
+            <a:endParaRPr lang="en-US" sz="2800" dirty="0" smtClean="0">
               <a:latin typeface="Calibri" pitchFamily="34" charset="0"/>
             </a:endParaRPr>
           </a:p>
           <a:p>
-            <a:pPr eaLnBrk="1" hangingPunct="1"/>
-            <a:r>
-              <a:rPr lang="en-US" sz="3200" dirty="0" smtClean="0">
-                <a:latin typeface="Calibri" pitchFamily="34" charset="0"/>
-              </a:rPr>
-              <a:t>III. Games</a:t>
-            </a:r>
-          </a:p>
-          <a:p>
-            <a:pPr eaLnBrk="1" hangingPunct="1"/>
-            <a:r>
-              <a:rPr lang="en-US" sz="3200" dirty="0">
-                <a:latin typeface="Calibri" pitchFamily="34" charset="0"/>
-              </a:rPr>
-              <a:t>	</a:t>
-            </a:r>
-            <a:r>
-              <a:rPr lang="en-US" sz="3200" dirty="0" smtClean="0">
-                <a:latin typeface="Calibri" pitchFamily="34" charset="0"/>
-              </a:rPr>
-              <a:t>a. Caves</a:t>
-            </a:r>
-          </a:p>
-          <a:p>
-            <a:pPr eaLnBrk="1" hangingPunct="1"/>
-            <a:r>
-              <a:rPr lang="en-US" sz="3200" dirty="0">
-                <a:latin typeface="Calibri" pitchFamily="34" charset="0"/>
-              </a:rPr>
-              <a:t>	</a:t>
-            </a:r>
-            <a:r>
-              <a:rPr lang="en-US" sz="3200" dirty="0" smtClean="0">
-                <a:latin typeface="Calibri" pitchFamily="34" charset="0"/>
-              </a:rPr>
-              <a:t>b. Terrain?</a:t>
-            </a:r>
-          </a:p>
-          <a:p>
-            <a:pPr eaLnBrk="1" hangingPunct="1"/>
-            <a:r>
-              <a:rPr lang="en-US" sz="3200" dirty="0" smtClean="0">
-                <a:latin typeface="Calibri" pitchFamily="34" charset="0"/>
-              </a:rPr>
-              <a:t>	c. Mazes</a:t>
-            </a:r>
-          </a:p>
-          <a:p>
-            <a:pPr eaLnBrk="1" hangingPunct="1"/>
-            <a:r>
-              <a:rPr lang="en-US" sz="3200" dirty="0" smtClean="0">
-                <a:latin typeface="Calibri" pitchFamily="34" charset="0"/>
-              </a:rPr>
-              <a:t>IV. Math Problems ?</a:t>
-            </a:r>
-          </a:p>
-          <a:p>
             <a:pPr lvl="1" indent="0" eaLnBrk="1" hangingPunct="1"/>
             <a:r>
-              <a:rPr lang="en-US" sz="3200" dirty="0">
-                <a:latin typeface="Calibri" pitchFamily="34" charset="0"/>
-              </a:rPr>
-              <a:t>	 a.</a:t>
+              <a:rPr lang="en-US" sz="2800" dirty="0" smtClean="0">
+                <a:latin typeface="Calibri" pitchFamily="34" charset="0"/>
+              </a:rPr>
+              <a:t>b</a:t>
+            </a:r>
+            <a:r>
+              <a:rPr lang="en-US" sz="2800" dirty="0" smtClean="0">
+                <a:latin typeface="Calibri" pitchFamily="34" charset="0"/>
+              </a:rPr>
+              <a:t>. Networking</a:t>
             </a:r>
           </a:p>
           <a:p>
             <a:pPr lvl="1" indent="0" eaLnBrk="1" hangingPunct="1"/>
-            <a:r>
-              <a:rPr lang="en-US" sz="3200" dirty="0" smtClean="0">
-                <a:latin typeface="Calibri" pitchFamily="34" charset="0"/>
-              </a:rPr>
-              <a:t>	 b</a:t>
-            </a:r>
-            <a:r>
-              <a:rPr lang="en-US" sz="3200" dirty="0">
-                <a:latin typeface="Calibri" pitchFamily="34" charset="0"/>
-              </a:rPr>
-              <a:t>.</a:t>
-            </a:r>
-            <a:endParaRPr lang="en-US" sz="3200" dirty="0" smtClean="0">
+            <a:endParaRPr lang="en-US" sz="2800" dirty="0" smtClean="0">
               <a:latin typeface="Calibri" pitchFamily="34" charset="0"/>
             </a:endParaRPr>
           </a:p>
           <a:p>
             <a:pPr eaLnBrk="1" hangingPunct="1"/>
-            <a:endParaRPr lang="en-US" sz="3200" dirty="0">
+            <a:r>
+              <a:rPr lang="en-US" sz="2800" dirty="0" smtClean="0">
+                <a:latin typeface="Calibri" pitchFamily="34" charset="0"/>
+              </a:rPr>
+              <a:t>II. Data Structures</a:t>
+            </a:r>
+          </a:p>
+          <a:p>
+            <a:pPr lvl="1" indent="0" eaLnBrk="1" hangingPunct="1"/>
+            <a:r>
+              <a:rPr lang="en-US" sz="2800" dirty="0">
+                <a:latin typeface="Calibri" pitchFamily="34" charset="0"/>
+              </a:rPr>
+              <a:t>	 a</a:t>
+            </a:r>
+            <a:r>
+              <a:rPr lang="en-US" sz="2800" dirty="0" smtClean="0">
+                <a:latin typeface="Calibri" pitchFamily="34" charset="0"/>
+              </a:rPr>
+              <a:t>. Maps</a:t>
+            </a:r>
+            <a:endParaRPr lang="en-US" sz="2800" dirty="0">
               <a:latin typeface="Calibri" pitchFamily="34" charset="0"/>
             </a:endParaRPr>
           </a:p>
           <a:p>
-            <a:pPr eaLnBrk="1" hangingPunct="1"/>
-            <a:endParaRPr lang="en-US" sz="3200" dirty="0" smtClean="0">
+            <a:pPr lvl="1" indent="0" eaLnBrk="1" hangingPunct="1"/>
+            <a:r>
+              <a:rPr lang="en-US" sz="2800" dirty="0" smtClean="0">
+                <a:latin typeface="Calibri" pitchFamily="34" charset="0"/>
+              </a:rPr>
+              <a:t>   </a:t>
+            </a:r>
+            <a:r>
+              <a:rPr lang="en-US" sz="2800" dirty="0" smtClean="0">
+                <a:latin typeface="Calibri" pitchFamily="34" charset="0"/>
+              </a:rPr>
+              <a:t>b. Sets</a:t>
+            </a:r>
+          </a:p>
+          <a:p>
+            <a:pPr lvl="1" indent="0" eaLnBrk="1" hangingPunct="1"/>
+            <a:endParaRPr lang="en-US" sz="2800" dirty="0" smtClean="0">
               <a:latin typeface="Calibri" pitchFamily="34" charset="0"/>
             </a:endParaRPr>
           </a:p>
           <a:p>
             <a:pPr eaLnBrk="1" hangingPunct="1"/>
-            <a:endParaRPr lang="en-US" sz="3200" dirty="0" smtClean="0">
+            <a:r>
+              <a:rPr lang="en-US" sz="2800" dirty="0" smtClean="0">
+                <a:latin typeface="Calibri" pitchFamily="34" charset="0"/>
+              </a:rPr>
+              <a:t>III. Games</a:t>
+            </a:r>
+          </a:p>
+          <a:p>
+            <a:pPr eaLnBrk="1" hangingPunct="1"/>
+            <a:r>
+              <a:rPr lang="en-US" sz="2800" dirty="0">
+                <a:latin typeface="Calibri" pitchFamily="34" charset="0"/>
+              </a:rPr>
+              <a:t>	</a:t>
+            </a:r>
+            <a:r>
+              <a:rPr lang="en-US" sz="2800" dirty="0" smtClean="0">
+                <a:latin typeface="Calibri" pitchFamily="34" charset="0"/>
+              </a:rPr>
+              <a:t>a. Caves</a:t>
+            </a:r>
+          </a:p>
+          <a:p>
+            <a:pPr eaLnBrk="1" hangingPunct="1"/>
+            <a:r>
+              <a:rPr lang="en-US" sz="2800" dirty="0">
+                <a:latin typeface="Calibri" pitchFamily="34" charset="0"/>
+              </a:rPr>
+              <a:t>	</a:t>
+            </a:r>
+            <a:r>
+              <a:rPr lang="en-US" sz="2800" dirty="0" smtClean="0">
+                <a:latin typeface="Calibri" pitchFamily="34" charset="0"/>
+              </a:rPr>
+              <a:t>b. </a:t>
+            </a:r>
+            <a:r>
+              <a:rPr lang="en-US" sz="2800" dirty="0" smtClean="0">
+                <a:latin typeface="Calibri" pitchFamily="34" charset="0"/>
+              </a:rPr>
+              <a:t>Terrain</a:t>
+            </a:r>
+            <a:endParaRPr lang="en-US" sz="2800" dirty="0" smtClean="0">
+              <a:latin typeface="Calibri" pitchFamily="34" charset="0"/>
+            </a:endParaRPr>
+          </a:p>
+          <a:p>
+            <a:pPr eaLnBrk="1" hangingPunct="1"/>
+            <a:r>
+              <a:rPr lang="en-US" sz="2800" dirty="0" smtClean="0">
+                <a:latin typeface="Calibri" pitchFamily="34" charset="0"/>
+              </a:rPr>
+              <a:t>	c. </a:t>
+            </a:r>
+            <a:r>
+              <a:rPr lang="en-US" sz="2800" dirty="0" smtClean="0">
+                <a:latin typeface="Calibri" pitchFamily="34" charset="0"/>
+              </a:rPr>
+              <a:t>Mazes</a:t>
+            </a:r>
+          </a:p>
+          <a:p>
+            <a:pPr eaLnBrk="1" hangingPunct="1"/>
+            <a:endParaRPr lang="en-US" sz="2800" dirty="0" smtClean="0">
+              <a:latin typeface="Calibri" pitchFamily="34" charset="0"/>
+            </a:endParaRPr>
+          </a:p>
+          <a:p>
+            <a:pPr eaLnBrk="1" hangingPunct="1"/>
+            <a:r>
+              <a:rPr lang="en-US" sz="2800" dirty="0" smtClean="0">
+                <a:latin typeface="Calibri" pitchFamily="34" charset="0"/>
+              </a:rPr>
+              <a:t>IV. Math </a:t>
+            </a:r>
+            <a:r>
+              <a:rPr lang="en-US" sz="2800" dirty="0" smtClean="0">
+                <a:latin typeface="Calibri" pitchFamily="34" charset="0"/>
+              </a:rPr>
+              <a:t>Problems</a:t>
+            </a:r>
+            <a:endParaRPr lang="en-US" sz="2800" dirty="0" smtClean="0">
+              <a:latin typeface="Calibri" pitchFamily="34" charset="0"/>
+            </a:endParaRPr>
+          </a:p>
+          <a:p>
+            <a:pPr lvl="1" indent="0" eaLnBrk="1" hangingPunct="1"/>
+            <a:r>
+              <a:rPr lang="en-US" sz="2800" dirty="0">
+                <a:latin typeface="Calibri" pitchFamily="34" charset="0"/>
+              </a:rPr>
+              <a:t>	 a</a:t>
+            </a:r>
+            <a:r>
+              <a:rPr lang="en-US" sz="2800" dirty="0" smtClean="0">
+                <a:latin typeface="Calibri" pitchFamily="34" charset="0"/>
+              </a:rPr>
+              <a:t>. Graph Theory</a:t>
+            </a:r>
+            <a:endParaRPr lang="en-US" sz="2800" dirty="0">
+              <a:latin typeface="Calibri" pitchFamily="34" charset="0"/>
+            </a:endParaRPr>
+          </a:p>
+          <a:p>
+            <a:pPr lvl="1" indent="0" eaLnBrk="1" hangingPunct="1"/>
+            <a:r>
+              <a:rPr lang="en-US" sz="2800" dirty="0" smtClean="0">
+                <a:latin typeface="Calibri" pitchFamily="34" charset="0"/>
+              </a:rPr>
+              <a:t>	 b</a:t>
+            </a:r>
+            <a:r>
+              <a:rPr lang="en-US" sz="2800" dirty="0" smtClean="0">
+                <a:latin typeface="Calibri" pitchFamily="34" charset="0"/>
+              </a:rPr>
+              <a:t>. </a:t>
+            </a:r>
+            <a:r>
+              <a:rPr lang="en-US" sz="2800" dirty="0" smtClean="0">
+                <a:latin typeface="Calibri" pitchFamily="34" charset="0"/>
+              </a:rPr>
+              <a:t>Combinatorics</a:t>
+            </a:r>
+            <a:endParaRPr lang="en-US" sz="2800" dirty="0" smtClean="0">
               <a:latin typeface="Calibri" pitchFamily="34" charset="0"/>
             </a:endParaRPr>
           </a:p>
@@ -3645,7 +3749,7 @@
         </p:nvSpPr>
         <p:spPr>
           <a:xfrm>
-            <a:off x="29077920" y="4745194"/>
+            <a:off x="29077920" y="4731177"/>
             <a:ext cx="13167360" cy="731520"/>
           </a:xfrm>
           <a:prstGeom prst="rect">
@@ -3706,8 +3810,8 @@
         </p:nvSpPr>
         <p:spPr bwMode="auto">
           <a:xfrm>
-            <a:off x="29260800" y="17801673"/>
-            <a:ext cx="13167360" cy="5693820"/>
+            <a:off x="29260800" y="15789770"/>
+            <a:ext cx="13167360" cy="5201377"/>
           </a:xfrm>
           <a:prstGeom prst="rect">
             <a:avLst/>
@@ -3832,30 +3936,9 @@
               <a:rPr lang="en-US" sz="3200" dirty="0" smtClean="0">
                 <a:latin typeface="Calibri" pitchFamily="34" charset="0"/>
               </a:rPr>
-              <a:t>RB Trees are used in real world systems to make searching and sorting easier, faster, and more efficient. Red Black trees are often times the most efficient tree-like data structure to use in the appropriate context. The Red Black Tree can also be used to implement other data structures in the most efficient way possible. Although RB Trees are generally very efficient in terms of time complexity, they are sometimes less efficient than other data structures because of memory over head</a:t>
-            </a:r>
-            <a:r>
-              <a:rPr lang="en-US" sz="3200" dirty="0" smtClean="0">
-                <a:latin typeface="Calibri" pitchFamily="34" charset="0"/>
-              </a:rPr>
-              <a:t>. </a:t>
-            </a:r>
-            <a:r>
-              <a:rPr lang="en-US" sz="3200" dirty="0" smtClean="0">
-                <a:latin typeface="Calibri" pitchFamily="34" charset="0"/>
-              </a:rPr>
-              <a:t>We’ve found that Red Black Trees work well along side Hash-like and Map data structures. We hope to see more Red Black Tree projects in the future. We hope to design and study more RB Tree systems and share </a:t>
-            </a:r>
-            <a:r>
-              <a:rPr lang="en-US" sz="3200" smtClean="0">
-                <a:latin typeface="Calibri" pitchFamily="34" charset="0"/>
-              </a:rPr>
-              <a:t>our results. </a:t>
-            </a:r>
-          </a:p>
-          <a:p>
-            <a:pPr eaLnBrk="1" hangingPunct="1"/>
-            <a:endParaRPr lang="en-US" sz="3200" dirty="0">
+              <a:t>RB Trees are used in real world systems to make searching and sorting easier, faster, and more efficient. Red Black trees are often times the most efficient tree-like data structure to use in the appropriate context. The Red Black Tree can also be used to implement other data structures in the most efficient way possible. Although RB Trees are generally very efficient in terms of time complexity, they are sometimes less efficient than other data structures because of memory over head. We’ve found that Red Black Trees work well along side Hash-like and Map data structures. We hope to see more Red Black Tree projects in the future. We hope to design and study more RB Tree systems and share our results. </a:t>
+            </a:r>
+            <a:endParaRPr lang="en-US" sz="3200" dirty="0" smtClean="0">
               <a:latin typeface="Calibri" pitchFamily="34" charset="0"/>
             </a:endParaRPr>
           </a:p>
@@ -3869,7 +3952,7 @@
         </p:nvSpPr>
         <p:spPr>
           <a:xfrm>
-            <a:off x="29260800" y="17070153"/>
+            <a:off x="29260800" y="15058250"/>
             <a:ext cx="13167360" cy="731520"/>
           </a:xfrm>
           <a:prstGeom prst="rect">
@@ -3930,8 +4013,8 @@
         </p:nvSpPr>
         <p:spPr bwMode="auto">
           <a:xfrm>
-            <a:off x="15411402" y="22246600"/>
-            <a:ext cx="13167360" cy="5693820"/>
+            <a:off x="15361920" y="20408113"/>
+            <a:ext cx="13167360" cy="7171147"/>
           </a:xfrm>
           <a:prstGeom prst="rect">
             <a:avLst/>
@@ -3949,7 +4032,7 @@
           <a:effectLst/>
         </p:spPr>
         <p:txBody>
-          <a:bodyPr lIns="137137" tIns="137137" rIns="137137" bIns="137137">
+          <a:bodyPr wrap="square" lIns="137137" tIns="137137" rIns="137137" bIns="137137">
             <a:spAutoFit/>
           </a:bodyPr>
           <a:lstStyle>
@@ -4053,11 +4136,80 @@
           <a:p>
             <a:pPr eaLnBrk="1" hangingPunct="1"/>
             <a:r>
-              <a:rPr lang="en-US" sz="3200" dirty="0" smtClean="0">
-                <a:latin typeface="Calibri" pitchFamily="34" charset="0"/>
-              </a:rPr>
-              <a:t>We proposed a system in which Red Black Trees were used directly and indirectly. </a:t>
-            </a:r>
+              <a:rPr lang="en-US" sz="2800" dirty="0" smtClean="0">
+                <a:latin typeface="Calibri" pitchFamily="34" charset="0"/>
+              </a:rPr>
+              <a:t>We </a:t>
+            </a:r>
+            <a:r>
+              <a:rPr lang="en-US" sz="2800" dirty="0">
+                <a:latin typeface="Calibri" pitchFamily="34" charset="0"/>
+              </a:rPr>
+              <a:t>worked with a large school database and used RB trees, Java </a:t>
+            </a:r>
+            <a:r>
+              <a:rPr lang="en-US" sz="2800" dirty="0" err="1">
+                <a:latin typeface="Calibri" pitchFamily="34" charset="0"/>
+              </a:rPr>
+              <a:t>TreeMaps</a:t>
+            </a:r>
+            <a:r>
+              <a:rPr lang="en-US" sz="2800" dirty="0">
+                <a:latin typeface="Calibri" pitchFamily="34" charset="0"/>
+              </a:rPr>
+              <a:t>, and Object Oriented Programming</a:t>
+            </a:r>
+            <a:r>
+              <a:rPr lang="en-US" sz="2800" dirty="0" smtClean="0">
+                <a:latin typeface="Calibri" pitchFamily="34" charset="0"/>
+              </a:rPr>
+              <a:t>.</a:t>
+            </a:r>
+            <a:endParaRPr lang="en-US" sz="2800" dirty="0" smtClean="0">
+              <a:latin typeface="Calibri" pitchFamily="34" charset="0"/>
+            </a:endParaRPr>
+          </a:p>
+          <a:p>
+            <a:pPr eaLnBrk="1" hangingPunct="1"/>
+            <a:endParaRPr lang="en-US" sz="2800" dirty="0">
+              <a:latin typeface="Calibri" pitchFamily="34" charset="0"/>
+            </a:endParaRPr>
+          </a:p>
+          <a:p>
+            <a:pPr eaLnBrk="1" hangingPunct="1"/>
+            <a:r>
+              <a:rPr lang="en-US" sz="2800" dirty="0" smtClean="0">
+                <a:latin typeface="Calibri" pitchFamily="34" charset="0"/>
+              </a:rPr>
+              <a:t>We </a:t>
+            </a:r>
+            <a:r>
+              <a:rPr lang="en-US" sz="2800" dirty="0" smtClean="0">
+                <a:latin typeface="Calibri" pitchFamily="34" charset="0"/>
+              </a:rPr>
+              <a:t>proposed </a:t>
+            </a:r>
+            <a:r>
+              <a:rPr lang="en-US" sz="2800" dirty="0" smtClean="0">
+                <a:latin typeface="Calibri" pitchFamily="34" charset="0"/>
+              </a:rPr>
+              <a:t>system </a:t>
+            </a:r>
+            <a:r>
+              <a:rPr lang="en-US" sz="2800" dirty="0" smtClean="0">
+                <a:latin typeface="Calibri" pitchFamily="34" charset="0"/>
+              </a:rPr>
+              <a:t>in which Red Black Trees were used directly and indirectly</a:t>
+            </a:r>
+            <a:r>
+              <a:rPr lang="en-US" sz="2800" dirty="0" smtClean="0">
+                <a:latin typeface="Calibri" pitchFamily="34" charset="0"/>
+              </a:rPr>
+              <a:t>.</a:t>
+            </a:r>
+            <a:endParaRPr lang="en-US" sz="2800" dirty="0" smtClean="0">
+              <a:latin typeface="Calibri" pitchFamily="34" charset="0"/>
+            </a:endParaRPr>
           </a:p>
           <a:p>
             <a:pPr marL="457200" indent="-457200" eaLnBrk="1" hangingPunct="1">
@@ -4065,7 +4217,7 @@
               <a:buChar char="•"/>
             </a:pPr>
             <a:r>
-              <a:rPr lang="en-US" sz="3200" dirty="0" smtClean="0">
+              <a:rPr lang="en-US" sz="2800" dirty="0" smtClean="0">
                 <a:latin typeface="Calibri" pitchFamily="34" charset="0"/>
               </a:rPr>
               <a:t>RB Tree Indirect Use: We placed students into a Java Tree Map</a:t>
@@ -4077,59 +4229,77 @@
               <a:buChar char="•"/>
             </a:pPr>
             <a:r>
-              <a:rPr lang="en-US" sz="3200" dirty="0" smtClean="0">
-                <a:latin typeface="Calibri" pitchFamily="34" charset="0"/>
-              </a:rPr>
-              <a:t>RB Tree Direct Use: We used a RB Tree implementation to organize students’ ID numbers</a:t>
+              <a:rPr lang="en-US" sz="2800" dirty="0" smtClean="0">
+                <a:latin typeface="Calibri" pitchFamily="34" charset="0"/>
+              </a:rPr>
+              <a:t>RB Tree Direct Use: We used a RB Tree implementation to organize students’ ID </a:t>
+            </a:r>
+            <a:r>
+              <a:rPr lang="en-US" sz="2800" dirty="0" smtClean="0">
+                <a:latin typeface="Calibri" pitchFamily="34" charset="0"/>
+              </a:rPr>
+              <a:t>numbers from a school database</a:t>
             </a:r>
           </a:p>
           <a:p>
             <a:pPr eaLnBrk="1" hangingPunct="1"/>
-            <a:endParaRPr lang="en-US" sz="3200" dirty="0">
+            <a:endParaRPr lang="en-US" sz="2800" dirty="0" smtClean="0">
               <a:latin typeface="Calibri" pitchFamily="34" charset="0"/>
             </a:endParaRPr>
           </a:p>
           <a:p>
             <a:pPr eaLnBrk="1" hangingPunct="1"/>
             <a:r>
-              <a:rPr lang="en-US" sz="3200" dirty="0" smtClean="0">
-                <a:latin typeface="Calibri" pitchFamily="34" charset="0"/>
-              </a:rPr>
-              <a:t>Theoretical Calculations: RB trees compared to BST or AVL</a:t>
+              <a:rPr lang="en-US" sz="2800" dirty="0">
+                <a:latin typeface="Calibri" pitchFamily="34" charset="0"/>
+              </a:rPr>
+              <a:t>We designed a phone lookup service to tell the user what country the caller is coming from. Because phone numbers are unique and the dataset is so large, using RB Trees made searching and sorting very fast and efficient. </a:t>
             </a:r>
           </a:p>
           <a:p>
             <a:pPr eaLnBrk="1" hangingPunct="1"/>
-            <a:endParaRPr lang="en-US" sz="3200" dirty="0" smtClean="0">
+            <a:endParaRPr lang="en-US" sz="2800" dirty="0" smtClean="0">
               <a:latin typeface="Calibri" pitchFamily="34" charset="0"/>
             </a:endParaRPr>
           </a:p>
           <a:p>
             <a:pPr eaLnBrk="1" hangingPunct="1"/>
-            <a:r>
-              <a:rPr lang="en-US" sz="3200" dirty="0" smtClean="0">
-                <a:latin typeface="Calibri" pitchFamily="34" charset="0"/>
-              </a:rPr>
-              <a:t>Input size: 2000 lines</a:t>
-            </a:r>
+            <a:endParaRPr lang="en-US" sz="2800" dirty="0" smtClean="0">
+              <a:latin typeface="Calibri" pitchFamily="34" charset="0"/>
+            </a:endParaRPr>
           </a:p>
           <a:p>
             <a:pPr eaLnBrk="1" hangingPunct="1"/>
             <a:r>
-              <a:rPr lang="en-US" sz="3200" dirty="0" smtClean="0">
-                <a:latin typeface="Calibri" pitchFamily="34" charset="0"/>
-              </a:rPr>
-              <a:t>Linear Data Structure: O(N)</a:t>
-            </a:r>
+              <a:rPr lang="en-US" sz="2800" dirty="0" smtClean="0">
+                <a:latin typeface="Calibri" pitchFamily="34" charset="0"/>
+              </a:rPr>
+              <a:t>We implemented a phone lookup service in which we used Red Black trees  directly: </a:t>
+            </a:r>
+            <a:endParaRPr lang="en-US" sz="2800" dirty="0">
+              <a:latin typeface="Calibri" pitchFamily="34" charset="0"/>
+            </a:endParaRPr>
+          </a:p>
+          <a:p>
+            <a:pPr marL="457200" indent="-457200" eaLnBrk="1" hangingPunct="1">
+              <a:buFont typeface="Arial" panose="020B0604020202020204" pitchFamily="34" charset="0"/>
+              <a:buChar char="•"/>
+            </a:pPr>
+            <a:r>
+              <a:rPr lang="en-US" sz="2800" dirty="0" smtClean="0">
+                <a:latin typeface="Calibri" pitchFamily="34" charset="0"/>
+              </a:rPr>
+              <a:t>Direct Use: We organized the numbers in the RB Tree for easy searching</a:t>
+            </a:r>
+            <a:endParaRPr lang="en-US" sz="2800" dirty="0">
+              <a:latin typeface="Calibri" pitchFamily="34" charset="0"/>
+            </a:endParaRPr>
           </a:p>
           <a:p>
             <a:pPr eaLnBrk="1" hangingPunct="1"/>
-            <a:r>
-              <a:rPr lang="en-US" sz="3200" dirty="0" smtClean="0">
-                <a:latin typeface="Calibri" pitchFamily="34" charset="0"/>
-              </a:rPr>
-              <a:t>RB Tree: O(log_2)</a:t>
-            </a:r>
+            <a:endParaRPr lang="en-US" sz="2800" dirty="0" smtClean="0">
+              <a:latin typeface="Calibri" pitchFamily="34" charset="0"/>
+            </a:endParaRPr>
           </a:p>
         </p:txBody>
       </p:sp>
@@ -4141,7 +4311,7 @@
         </p:nvSpPr>
         <p:spPr>
           <a:xfrm>
-            <a:off x="15391737" y="21520057"/>
+            <a:off x="15361920" y="19679906"/>
             <a:ext cx="13167360" cy="731520"/>
           </a:xfrm>
           <a:prstGeom prst="rect">
@@ -4187,23 +4357,7 @@
                   <a:schemeClr val="bg1"/>
                 </a:solidFill>
               </a:rPr>
-              <a:t>Implementing </a:t>
-            </a:r>
-            <a:r>
-              <a:rPr lang="en-US" sz="4400" b="1" dirty="0" err="1" smtClean="0">
-                <a:solidFill>
-                  <a:schemeClr val="bg1"/>
-                </a:solidFill>
-              </a:rPr>
-              <a:t>TreeMaps</a:t>
-            </a:r>
-            <a:r>
-              <a:rPr lang="en-US" sz="4400" b="1" dirty="0" smtClean="0">
-                <a:solidFill>
-                  <a:schemeClr val="bg1"/>
-                </a:solidFill>
-              </a:rPr>
-              <a:t> Using Red Black Trees</a:t>
+              <a:t>Our Group’s Applications</a:t>
             </a:r>
             <a:endParaRPr lang="en-US" sz="4400" b="1" dirty="0">
               <a:solidFill>
@@ -4221,7 +4375,7 @@
         </p:nvSpPr>
         <p:spPr>
           <a:xfrm>
-            <a:off x="15361920" y="14838941"/>
+            <a:off x="15361920" y="13115604"/>
             <a:ext cx="13167360" cy="731520"/>
           </a:xfrm>
           <a:prstGeom prst="rect">
@@ -4287,7 +4441,7 @@
         </p:nvSpPr>
         <p:spPr bwMode="auto">
           <a:xfrm>
-            <a:off x="15361920" y="15570461"/>
+            <a:off x="15361920" y="13832983"/>
             <a:ext cx="13167360" cy="5201377"/>
           </a:xfrm>
           <a:prstGeom prst="rect">
@@ -4428,92 +4582,41 @@
               <a:rPr lang="en-US" sz="3200" dirty="0" smtClean="0">
                 <a:latin typeface="Calibri" pitchFamily="34" charset="0"/>
               </a:rPr>
-              <a:t>Java – Tree Maps, Tree Sets</a:t>
+              <a:t>Java – Tree Maps, Tree </a:t>
+            </a:r>
+            <a:r>
+              <a:rPr lang="en-US" sz="3200" dirty="0" smtClean="0">
+                <a:latin typeface="Calibri" pitchFamily="34" charset="0"/>
+              </a:rPr>
+              <a:t>Sets</a:t>
+            </a:r>
+          </a:p>
+          <a:p>
+            <a:pPr marL="1200150" lvl="1" indent="-457200" eaLnBrk="1" hangingPunct="1">
+              <a:buFont typeface="Arial" panose="020B0604020202020204" pitchFamily="34" charset="0"/>
+              <a:buChar char="•"/>
+            </a:pPr>
+            <a:r>
+              <a:rPr lang="en-US" sz="3200" dirty="0" smtClean="0">
+                <a:latin typeface="Calibri" pitchFamily="34" charset="0"/>
+              </a:rPr>
+              <a:t>balances the tree</a:t>
             </a:r>
           </a:p>
           <a:p>
             <a:pPr eaLnBrk="1" hangingPunct="1"/>
             <a:r>
+              <a:rPr lang="en-US" sz="3200" dirty="0">
+                <a:latin typeface="Calibri" pitchFamily="34" charset="0"/>
+              </a:rPr>
+              <a:t>	</a:t>
+            </a:r>
+            <a:r>
               <a:rPr lang="en-US" sz="3200" dirty="0" smtClean="0">
                 <a:latin typeface="Calibri" pitchFamily="34" charset="0"/>
               </a:rPr>
-              <a:t>C++ – </a:t>
-            </a:r>
-          </a:p>
-          <a:p>
-            <a:pPr eaLnBrk="1" hangingPunct="1"/>
-            <a:r>
-              <a:rPr lang="en-US" sz="3200" dirty="0" smtClean="0">
-                <a:latin typeface="Calibri" pitchFamily="34" charset="0"/>
-              </a:rPr>
-              <a:t>Other </a:t>
-            </a:r>
-            <a:r>
-              <a:rPr lang="en-US" sz="3200" dirty="0" err="1" smtClean="0">
-                <a:latin typeface="Calibri" pitchFamily="34" charset="0"/>
-              </a:rPr>
-              <a:t>lang</a:t>
-            </a:r>
-            <a:r>
-              <a:rPr lang="en-US" sz="3200" dirty="0" smtClean="0">
-                <a:latin typeface="Calibri" pitchFamily="34" charset="0"/>
-              </a:rPr>
-              <a:t> –</a:t>
-            </a:r>
-          </a:p>
-          <a:p>
-            <a:pPr eaLnBrk="1" hangingPunct="1"/>
-            <a:r>
-              <a:rPr lang="en-US" sz="3200" dirty="0" smtClean="0">
-                <a:latin typeface="Calibri" pitchFamily="34" charset="0"/>
-              </a:rPr>
-              <a:t>Other </a:t>
-            </a:r>
-            <a:r>
-              <a:rPr lang="en-US" sz="3200" dirty="0" err="1" smtClean="0">
-                <a:latin typeface="Calibri" pitchFamily="34" charset="0"/>
-              </a:rPr>
-              <a:t>lang</a:t>
-            </a:r>
-            <a:r>
-              <a:rPr lang="en-US" sz="3200" dirty="0" smtClean="0">
-                <a:latin typeface="Calibri" pitchFamily="34" charset="0"/>
-              </a:rPr>
-              <a:t> </a:t>
-            </a:r>
-            <a:r>
-              <a:rPr lang="en-US" sz="3200" dirty="0">
-                <a:latin typeface="Calibri" pitchFamily="34" charset="0"/>
-              </a:rPr>
-              <a:t>– </a:t>
-            </a:r>
-            <a:endParaRPr lang="en-US" sz="3200" dirty="0" smtClean="0">
-              <a:latin typeface="Calibri" pitchFamily="34" charset="0"/>
-            </a:endParaRPr>
-          </a:p>
-          <a:p>
-            <a:pPr eaLnBrk="1" hangingPunct="1"/>
-            <a:r>
-              <a:rPr lang="en-US" sz="3200" dirty="0" smtClean="0">
-                <a:latin typeface="Calibri" pitchFamily="34" charset="0"/>
-              </a:rPr>
-              <a:t>Other </a:t>
-            </a:r>
-            <a:r>
-              <a:rPr lang="en-US" sz="3200" dirty="0" err="1" smtClean="0">
-                <a:latin typeface="Calibri" pitchFamily="34" charset="0"/>
-              </a:rPr>
-              <a:t>lang</a:t>
-            </a:r>
-            <a:r>
-              <a:rPr lang="en-US" sz="3200" dirty="0" smtClean="0">
-                <a:latin typeface="Calibri" pitchFamily="34" charset="0"/>
-              </a:rPr>
-              <a:t> – </a:t>
-            </a:r>
-            <a:endParaRPr lang="en-US" sz="3200" dirty="0">
-              <a:latin typeface="Calibri" pitchFamily="34" charset="0"/>
-            </a:endParaRPr>
+              <a:t>eliminates duplicates</a:t>
+            </a:r>
           </a:p>
           <a:p>
             <a:pPr eaLnBrk="1" hangingPunct="1"/>
@@ -4523,6 +4626,54 @@
           </a:p>
           <a:p>
             <a:pPr eaLnBrk="1" hangingPunct="1"/>
+            <a:r>
+              <a:rPr lang="en-US" sz="3200" dirty="0" smtClean="0">
+                <a:latin typeface="Calibri" pitchFamily="34" charset="0"/>
+              </a:rPr>
+              <a:t>C++ – </a:t>
+            </a:r>
+            <a:r>
+              <a:rPr lang="en-US" sz="3200" dirty="0" smtClean="0">
+                <a:latin typeface="Calibri" pitchFamily="34" charset="0"/>
+              </a:rPr>
+              <a:t>STL sets and maps</a:t>
+            </a:r>
+          </a:p>
+          <a:p>
+            <a:pPr eaLnBrk="1" hangingPunct="1"/>
+            <a:r>
+              <a:rPr lang="en-US" sz="3200" dirty="0">
+                <a:latin typeface="Calibri" pitchFamily="34" charset="0"/>
+              </a:rPr>
+              <a:t>	</a:t>
+            </a:r>
+            <a:r>
+              <a:rPr lang="en-US" sz="3200" dirty="0" smtClean="0">
+                <a:latin typeface="Calibri" pitchFamily="34" charset="0"/>
+              </a:rPr>
+              <a:t>*balances sets and maps</a:t>
+            </a:r>
+          </a:p>
+          <a:p>
+            <a:pPr eaLnBrk="1" hangingPunct="1"/>
+            <a:r>
+              <a:rPr lang="en-US" sz="3200" dirty="0">
+                <a:latin typeface="Calibri" pitchFamily="34" charset="0"/>
+              </a:rPr>
+              <a:t>	</a:t>
+            </a:r>
+            <a:r>
+              <a:rPr lang="en-US" sz="3200" dirty="0" smtClean="0">
+                <a:latin typeface="Calibri" pitchFamily="34" charset="0"/>
+              </a:rPr>
+              <a:t>*</a:t>
+            </a:r>
+            <a:r>
+              <a:rPr lang="en-US" sz="3200" dirty="0" smtClean="0">
+                <a:latin typeface="Calibri" pitchFamily="34" charset="0"/>
+              </a:rPr>
+              <a:t>prevents duplicates and degeneration</a:t>
+            </a:r>
             <a:endParaRPr lang="en-US" sz="3200" dirty="0" smtClean="0">
               <a:latin typeface="Calibri" pitchFamily="34" charset="0"/>
             </a:endParaRPr>
@@ -4539,8 +4690,8 @@
         </p:nvSpPr>
         <p:spPr bwMode="auto">
           <a:xfrm>
-            <a:off x="1463040" y="12802589"/>
-            <a:ext cx="13167360" cy="11110687"/>
+            <a:off x="1463040" y="12632845"/>
+            <a:ext cx="13167360" cy="15050227"/>
           </a:xfrm>
           <a:prstGeom prst="rect">
             <a:avLst/>
@@ -4856,6 +5007,76 @@
           </a:p>
           <a:p>
             <a:pPr lvl="1" indent="0" eaLnBrk="1" hangingPunct="1"/>
+            <a:endParaRPr lang="en-US" sz="3200" dirty="0" smtClean="0">
+              <a:latin typeface="+mn-lt"/>
+            </a:endParaRPr>
+          </a:p>
+          <a:p>
+            <a:pPr lvl="1" indent="0" eaLnBrk="1" hangingPunct="1"/>
+            <a:endParaRPr lang="en-US" sz="3200" dirty="0">
+              <a:latin typeface="+mn-lt"/>
+            </a:endParaRPr>
+          </a:p>
+          <a:p>
+            <a:pPr lvl="1" indent="0" eaLnBrk="1" hangingPunct="1"/>
+            <a:endParaRPr lang="en-US" sz="3200" dirty="0" smtClean="0">
+              <a:latin typeface="+mn-lt"/>
+            </a:endParaRPr>
+          </a:p>
+          <a:p>
+            <a:pPr eaLnBrk="1" hangingPunct="1"/>
+            <a:r>
+              <a:rPr lang="en-US" sz="3200" b="1" dirty="0">
+                <a:latin typeface="Calibri" pitchFamily="34" charset="0"/>
+              </a:rPr>
+              <a:t>Theoretical Calculations: RB trees compared to BST or AVL</a:t>
+            </a:r>
+          </a:p>
+          <a:p>
+            <a:pPr eaLnBrk="1" hangingPunct="1"/>
+            <a:endParaRPr lang="en-US" sz="3200" b="1" dirty="0">
+              <a:latin typeface="Calibri" pitchFamily="34" charset="0"/>
+            </a:endParaRPr>
+          </a:p>
+          <a:p>
+            <a:pPr eaLnBrk="1" hangingPunct="1"/>
+            <a:r>
+              <a:rPr lang="en-US" sz="3200" b="1" dirty="0">
+                <a:latin typeface="Calibri" pitchFamily="34" charset="0"/>
+              </a:rPr>
+              <a:t>Input size: 2000 lines</a:t>
+            </a:r>
+          </a:p>
+          <a:p>
+            <a:pPr eaLnBrk="1" hangingPunct="1"/>
+            <a:r>
+              <a:rPr lang="en-US" sz="3200" b="1" dirty="0">
+                <a:latin typeface="Calibri" pitchFamily="34" charset="0"/>
+              </a:rPr>
+              <a:t>Linear Data Structure: O(N) = 2000 comparisons</a:t>
+            </a:r>
+          </a:p>
+          <a:p>
+            <a:pPr eaLnBrk="1" hangingPunct="1"/>
+            <a:r>
+              <a:rPr lang="en-US" sz="3200" b="1" dirty="0">
+                <a:latin typeface="Calibri" pitchFamily="34" charset="0"/>
+              </a:rPr>
+              <a:t>RB Tree: O(log_2(N)) </a:t>
+            </a:r>
+            <a:r>
+              <a:rPr lang="en-US" sz="2800" b="1" dirty="0"/>
+              <a:t>≈</a:t>
+            </a:r>
+            <a:r>
+              <a:rPr lang="en-US" sz="3200" b="1" dirty="0">
+                <a:latin typeface="Calibri" pitchFamily="34" charset="0"/>
+              </a:rPr>
+              <a:t> 11 comparisons</a:t>
+            </a:r>
+          </a:p>
+          <a:p>
+            <a:pPr lvl="1" indent="0" eaLnBrk="1" hangingPunct="1"/>
             <a:endParaRPr lang="en-US" sz="3200" dirty="0">
               <a:latin typeface="+mn-lt"/>
             </a:endParaRPr>
@@ -4870,7 +5091,7 @@
         </p:nvSpPr>
         <p:spPr>
           <a:xfrm>
-            <a:off x="1463040" y="12083420"/>
+            <a:off x="1463040" y="11861793"/>
             <a:ext cx="13167360" cy="731520"/>
           </a:xfrm>
           <a:prstGeom prst="rect">
@@ -4943,58 +5164,12 @@
         </p:blipFill>
         <p:spPr>
           <a:xfrm>
-            <a:off x="3924300" y="18477087"/>
+            <a:off x="3644374" y="18288000"/>
             <a:ext cx="8610600" cy="4991230"/>
           </a:xfrm>
           <a:prstGeom prst="rect">
             <a:avLst/>
           </a:prstGeom>
-        </p:spPr>
-      </p:pic>
-      <p:pic>
-        <p:nvPicPr>
-          <p:cNvPr id="1028" name="Picture 4" descr="Image result for linux completely fair scheduler">
-            <a:extLst>
-              <a:ext uri="{FF2B5EF4-FFF2-40B4-BE49-F238E27FC236}">
-                <a16:creationId xmlns:a16="http://schemas.microsoft.com/office/drawing/2014/main" id="{8084E8F1-3811-4143-A85F-59F329044689}"/>
-              </a:ext>
-            </a:extLst>
-          </p:cNvPr>
-          <p:cNvPicPr>
-            <a:picLocks noChangeAspect="1" noChangeArrowheads="1"/>
-          </p:cNvPicPr>
-          <p:nvPr/>
-        </p:nvPicPr>
-        <p:blipFill>
-          <a:blip r:embed="rId3">
-            <a:extLst>
-              <a:ext uri="{28A0092B-C50C-407E-A947-70E740481C1C}">
-                <a14:useLocalDpi xmlns:a14="http://schemas.microsoft.com/office/drawing/2010/main" val="0"/>
-              </a:ext>
-            </a:extLst>
-          </a:blip>
-          <a:srcRect/>
-          <a:stretch>
-            <a:fillRect/>
-          </a:stretch>
-        </p:blipFill>
-        <p:spPr bwMode="auto">
-          <a:xfrm>
-            <a:off x="18592800" y="7222729"/>
-            <a:ext cx="5746766" cy="3668415"/>
-          </a:xfrm>
-          <a:prstGeom prst="rect">
-            <a:avLst/>
-          </a:prstGeom>
-          <a:extLst>
-            <a:ext uri="{909E8E84-426E-40DD-AFC4-6F175D3DCCD1}">
-              <a14:hiddenFill xmlns:a14="http://schemas.microsoft.com/office/drawing/2010/main">
-                <a:solidFill>
-                  <a:srgbClr val="FFFFFF"/>
-                </a:solidFill>
-              </a14:hiddenFill>
-            </a:ext>
-          </a:extLst>
         </p:spPr>
       </p:pic>
       <p:sp>
@@ -5023,6 +5198,280 @@
           </a:p>
         </p:txBody>
       </p:sp>
+      <p:pic>
+        <p:nvPicPr>
+          <p:cNvPr id="3" name="Picture 2"/>
+          <p:cNvPicPr>
+            <a:picLocks noChangeAspect="1"/>
+          </p:cNvPicPr>
+          <p:nvPr/>
+        </p:nvPicPr>
+        <p:blipFill>
+          <a:blip r:embed="rId3">
+            <a:extLst>
+              <a:ext uri="{28A0092B-C50C-407E-A947-70E740481C1C}">
+                <a14:useLocalDpi xmlns:a14="http://schemas.microsoft.com/office/drawing/2010/main" val="0"/>
+              </a:ext>
+            </a:extLst>
+          </a:blip>
+          <a:stretch>
+            <a:fillRect/>
+          </a:stretch>
+        </p:blipFill>
+        <p:spPr>
+          <a:xfrm>
+            <a:off x="18649950" y="7326807"/>
+            <a:ext cx="6591300" cy="3481476"/>
+          </a:xfrm>
+          <a:prstGeom prst="rect">
+            <a:avLst/>
+          </a:prstGeom>
+          <a:ln>
+            <a:solidFill>
+              <a:schemeClr val="accent1"/>
+            </a:solidFill>
+          </a:ln>
+        </p:spPr>
+      </p:pic>
+      <p:pic>
+        <p:nvPicPr>
+          <p:cNvPr id="9" name="Picture 8"/>
+          <p:cNvPicPr>
+            <a:picLocks noChangeAspect="1"/>
+          </p:cNvPicPr>
+          <p:nvPr/>
+        </p:nvPicPr>
+        <p:blipFill>
+          <a:blip r:embed="rId4">
+            <a:extLst>
+              <a:ext uri="{28A0092B-C50C-407E-A947-70E740481C1C}">
+                <a14:useLocalDpi xmlns:a14="http://schemas.microsoft.com/office/drawing/2010/main" val="0"/>
+              </a:ext>
+            </a:extLst>
+          </a:blip>
+          <a:stretch>
+            <a:fillRect/>
+          </a:stretch>
+        </p:blipFill>
+        <p:spPr>
+          <a:xfrm>
+            <a:off x="21628699" y="14824776"/>
+            <a:ext cx="6040754" cy="3277831"/>
+          </a:xfrm>
+          <a:prstGeom prst="rect">
+            <a:avLst/>
+          </a:prstGeom>
+          <a:ln>
+            <a:solidFill>
+              <a:schemeClr val="accent1">
+                <a:lumMod val="75000"/>
+              </a:schemeClr>
+            </a:solidFill>
+          </a:ln>
+        </p:spPr>
+      </p:pic>
+      <p:cxnSp>
+        <p:nvCxnSpPr>
+          <p:cNvPr id="17" name="Straight Connector 16"/>
+          <p:cNvCxnSpPr/>
+          <p:nvPr/>
+        </p:nvCxnSpPr>
+        <p:spPr>
+          <a:xfrm>
+            <a:off x="15361920" y="23619382"/>
+            <a:ext cx="13167360" cy="0"/>
+          </a:xfrm>
+          <a:prstGeom prst="line">
+            <a:avLst/>
+          </a:prstGeom>
+        </p:spPr>
+        <p:style>
+          <a:lnRef idx="1">
+            <a:schemeClr val="accent1"/>
+          </a:lnRef>
+          <a:fillRef idx="0">
+            <a:schemeClr val="accent1"/>
+          </a:fillRef>
+          <a:effectRef idx="0">
+            <a:schemeClr val="accent1"/>
+          </a:effectRef>
+          <a:fontRef idx="minor">
+            <a:schemeClr val="tx1"/>
+          </a:fontRef>
+        </p:style>
+      </p:cxnSp>
+      <p:pic>
+        <p:nvPicPr>
+          <p:cNvPr id="21" name="Picture 20"/>
+          <p:cNvPicPr>
+            <a:picLocks noChangeAspect="1"/>
+          </p:cNvPicPr>
+          <p:nvPr/>
+        </p:nvPicPr>
+        <p:blipFill>
+          <a:blip r:embed="rId5">
+            <a:extLst>
+              <a:ext uri="{28A0092B-C50C-407E-A947-70E740481C1C}">
+                <a14:useLocalDpi xmlns:a14="http://schemas.microsoft.com/office/drawing/2010/main" val="0"/>
+              </a:ext>
+            </a:extLst>
+          </a:blip>
+          <a:stretch>
+            <a:fillRect/>
+          </a:stretch>
+        </p:blipFill>
+        <p:spPr>
+          <a:xfrm>
+            <a:off x="34975800" y="6034455"/>
+            <a:ext cx="3275114" cy="2339367"/>
+          </a:xfrm>
+          <a:prstGeom prst="rect">
+            <a:avLst/>
+          </a:prstGeom>
+        </p:spPr>
+      </p:pic>
+      <p:pic>
+        <p:nvPicPr>
+          <p:cNvPr id="22" name="Picture 21"/>
+          <p:cNvPicPr>
+            <a:picLocks noChangeAspect="1"/>
+          </p:cNvPicPr>
+          <p:nvPr/>
+        </p:nvPicPr>
+        <p:blipFill>
+          <a:blip r:embed="rId6">
+            <a:extLst>
+              <a:ext uri="{28A0092B-C50C-407E-A947-70E740481C1C}">
+                <a14:useLocalDpi xmlns:a14="http://schemas.microsoft.com/office/drawing/2010/main" val="0"/>
+              </a:ext>
+            </a:extLst>
+          </a:blip>
+          <a:stretch>
+            <a:fillRect/>
+          </a:stretch>
+        </p:blipFill>
+        <p:spPr>
+          <a:xfrm>
+            <a:off x="38250914" y="8789331"/>
+            <a:ext cx="3409922" cy="1879396"/>
+          </a:xfrm>
+          <a:prstGeom prst="rect">
+            <a:avLst/>
+          </a:prstGeom>
+        </p:spPr>
+      </p:pic>
+      <p:pic>
+        <p:nvPicPr>
+          <p:cNvPr id="28" name="Picture 27"/>
+          <p:cNvPicPr>
+            <a:picLocks noChangeAspect="1"/>
+          </p:cNvPicPr>
+          <p:nvPr/>
+        </p:nvPicPr>
+        <p:blipFill>
+          <a:blip r:embed="rId7">
+            <a:extLst>
+              <a:ext uri="{28A0092B-C50C-407E-A947-70E740481C1C}">
+                <a14:useLocalDpi xmlns:a14="http://schemas.microsoft.com/office/drawing/2010/main" val="0"/>
+              </a:ext>
+            </a:extLst>
+          </a:blip>
+          <a:stretch>
+            <a:fillRect/>
+          </a:stretch>
+        </p:blipFill>
+        <p:spPr>
+          <a:xfrm>
+            <a:off x="33780574" y="9658189"/>
+            <a:ext cx="5422923" cy="3411194"/>
+          </a:xfrm>
+          <a:prstGeom prst="rect">
+            <a:avLst/>
+          </a:prstGeom>
+        </p:spPr>
+      </p:pic>
+      <p:pic>
+        <p:nvPicPr>
+          <p:cNvPr id="1026" name="Picture 2" descr="Screen Shot 2017-04-22 at 4.46.41 PM.png"/>
+          <p:cNvPicPr>
+            <a:picLocks noChangeAspect="1" noChangeArrowheads="1"/>
+          </p:cNvPicPr>
+          <p:nvPr/>
+        </p:nvPicPr>
+        <p:blipFill>
+          <a:blip r:embed="rId8">
+            <a:extLst>
+              <a:ext uri="{28A0092B-C50C-407E-A947-70E740481C1C}">
+                <a14:useLocalDpi xmlns:a14="http://schemas.microsoft.com/office/drawing/2010/main" val="0"/>
+              </a:ext>
+            </a:extLst>
+          </a:blip>
+          <a:srcRect/>
+          <a:stretch>
+            <a:fillRect/>
+          </a:stretch>
+        </p:blipFill>
+        <p:spPr bwMode="auto">
+          <a:xfrm>
+            <a:off x="29063794" y="22180873"/>
+            <a:ext cx="7271781" cy="5472735"/>
+          </a:xfrm>
+          <a:prstGeom prst="rect">
+            <a:avLst/>
+          </a:prstGeom>
+          <a:noFill/>
+          <a:extLst>
+            <a:ext uri="{909E8E84-426E-40DD-AFC4-6F175D3DCCD1}">
+              <a14:hiddenFill xmlns:a14="http://schemas.microsoft.com/office/drawing/2010/main">
+                <a:solidFill>
+                  <a:srgbClr val="FFFFFF"/>
+                </a:solidFill>
+              </a14:hiddenFill>
+            </a:ext>
+          </a:extLst>
+        </p:spPr>
+      </p:pic>
+      <p:pic>
+        <p:nvPicPr>
+          <p:cNvPr id="30" name="Picture 4" descr="Screen Shot 2017-04-22 at 10.25.31 PM.png"/>
+          <p:cNvPicPr>
+            <a:picLocks noChangeAspect="1" noChangeArrowheads="1"/>
+          </p:cNvPicPr>
+          <p:nvPr/>
+        </p:nvPicPr>
+        <p:blipFill>
+          <a:blip r:embed="rId9">
+            <a:extLst>
+              <a:ext uri="{28A0092B-C50C-407E-A947-70E740481C1C}">
+                <a14:useLocalDpi xmlns:a14="http://schemas.microsoft.com/office/drawing/2010/main" val="0"/>
+              </a:ext>
+            </a:extLst>
+          </a:blip>
+          <a:srcRect/>
+          <a:stretch>
+            <a:fillRect/>
+          </a:stretch>
+        </p:blipFill>
+        <p:spPr bwMode="auto">
+          <a:xfrm>
+            <a:off x="37107900" y="21919557"/>
+            <a:ext cx="5695950" cy="5734051"/>
+          </a:xfrm>
+          <a:prstGeom prst="rect">
+            <a:avLst/>
+          </a:prstGeom>
+          <a:noFill/>
+          <a:extLst>
+            <a:ext uri="{909E8E84-426E-40DD-AFC4-6F175D3DCCD1}">
+              <a14:hiddenFill xmlns:a14="http://schemas.microsoft.com/office/drawing/2010/main">
+                <a:solidFill>
+                  <a:srgbClr val="FFFFFF"/>
+                </a:solidFill>
+              </a14:hiddenFill>
+            </a:ext>
+          </a:extLst>
+        </p:spPr>
+      </p:pic>
     </p:spTree>
     <p:extLst>
       <p:ext uri="{BB962C8B-B14F-4D97-AF65-F5344CB8AC3E}">
@@ -5033,6 +5482,13 @@
   <p:clrMapOvr>
     <a:masterClrMapping/>
   </p:clrMapOvr>
+  <p:timing>
+    <p:tnLst>
+      <p:par>
+        <p:cTn id="1" dur="indefinite" restart="never" nodeType="tmRoot"/>
+      </p:par>
+    </p:tnLst>
+  </p:timing>
 </p:sld>
 </file>
 

</xml_diff>